<commit_message>
version of talk at FIU
</commit_message>
<xml_diff>
--- a/radical-magic.pptx
+++ b/radical-magic.pptx
@@ -3894,18 +3894,7 @@
                   </a:schemeClr>
                 </a:solidFill>
               </a:rPr>
-              <a:t>capability </a:t>
-            </a:r>
-            <a:r>
-              <a:rPr lang="en" dirty="0" smtClean="0">
-                <a:solidFill>
-                  <a:schemeClr val="tx1">
-                    <a:lumMod val="65000"/>
-                    <a:lumOff val="35000"/>
-                  </a:schemeClr>
-                </a:solidFill>
-              </a:rPr>
-              <a:t>amidst heterogeneous, dynamic resources requires </a:t>
+              <a:t>capability amidst heterogeneous, dynamic resources requires </a:t>
             </a:r>
             <a:r>
               <a:rPr lang="en" i="1" dirty="0" smtClean="0">
@@ -3994,18 +3983,7 @@
                   </a:schemeClr>
                 </a:solidFill>
               </a:rPr>
-              <a:t> about </a:t>
-            </a:r>
-            <a:r>
-              <a:rPr lang="en" dirty="0" smtClean="0">
-                <a:solidFill>
-                  <a:schemeClr val="tx1">
-                    <a:lumMod val="65000"/>
-                    <a:lumOff val="35000"/>
-                  </a:schemeClr>
-                </a:solidFill>
-              </a:rPr>
-              <a:t>performance</a:t>
+              <a:t> about performance</a:t>
             </a:r>
             <a:endParaRPr lang="en-US" dirty="0" smtClean="0">
               <a:solidFill>
@@ -5418,29 +5396,8 @@
             <a:pPr marL="800100" lvl="1" indent="-342900"/>
             <a:r>
               <a:rPr lang="en-US" sz="2000" dirty="0" smtClean="0"/>
-              <a:t>We posit: Fresh </a:t>
-            </a:r>
-            <a:r>
-              <a:rPr lang="en-US" sz="2000" dirty="0" smtClean="0"/>
-              <a:t>perspective on </a:t>
-            </a:r>
-            <a:r>
-              <a:rPr lang="en-US" sz="2000" dirty="0" smtClean="0"/>
-              <a:t>reasoning and </a:t>
-            </a:r>
-            <a:r>
-              <a:rPr lang="en-US" sz="2000" dirty="0" smtClean="0"/>
-              <a:t>federation </a:t>
-            </a:r>
-            <a:r>
-              <a:rPr lang="en-US" sz="2000" dirty="0" smtClean="0"/>
-              <a:t>of </a:t>
-            </a:r>
-            <a:r>
-              <a:rPr lang="en-US" sz="2000" dirty="0" smtClean="0"/>
-              <a:t>resources and thus providing well-defined capabilities</a:t>
-            </a:r>
-            <a:endParaRPr lang="en-US" sz="2000" dirty="0" smtClean="0"/>
+              <a:t>We posit: Fresh perspective on reasoning and federation of resources and thus providing well-defined capabilities</a:t>
+            </a:r>
           </a:p>
         </p:txBody>
       </p:sp>
@@ -5898,28 +5855,7 @@
                 <a:latin typeface="Arial" charset="0"/>
                 <a:ea typeface="ＭＳ Ｐゴシック" charset="0"/>
               </a:rPr>
-              <a:t> </a:t>
-            </a:r>
-            <a:r>
-              <a:rPr lang="en-US" sz="2000" dirty="0" smtClean="0">
-                <a:latin typeface="Arial" charset="0"/>
-                <a:ea typeface="ＭＳ Ｐゴシック" charset="0"/>
-              </a:rPr>
-              <a:t>microscopic theory of </a:t>
-            </a:r>
-            <a:r>
-              <a:rPr lang="en-US" sz="2000" dirty="0" smtClean="0">
-                <a:latin typeface="Arial" charset="0"/>
-                <a:ea typeface="ＭＳ Ｐゴシック" charset="0"/>
-              </a:rPr>
-              <a:t>distributed systems</a:t>
-            </a:r>
-            <a:r>
-              <a:rPr lang="en-US" sz="2000" dirty="0" smtClean="0">
-                <a:latin typeface="Arial" charset="0"/>
-                <a:ea typeface="ＭＳ Ｐゴシック" charset="0"/>
-              </a:rPr>
-              <a:t>!</a:t>
+              <a:t> microscopic theory of distributed systems!</a:t>
             </a:r>
           </a:p>
           <a:p>
@@ -6320,14 +6256,7 @@
                 <a:latin typeface="Arial" charset="0"/>
                 <a:ea typeface="ＭＳ Ｐゴシック" charset="0"/>
               </a:rPr>
-              <a:t>Middleware functionality and </a:t>
-            </a:r>
-            <a:r>
-              <a:rPr lang="en-US" sz="2000" dirty="0" smtClean="0">
-                <a:latin typeface="Arial" charset="0"/>
-                <a:ea typeface="ＭＳ Ｐゴシック" charset="0"/>
-              </a:rPr>
-              <a:t>semantics</a:t>
+              <a:t>Middleware functionality and semantics</a:t>
             </a:r>
             <a:endParaRPr lang="en-US" sz="2000" dirty="0">
               <a:latin typeface="Arial" charset="0"/>
@@ -6345,26 +6274,8 @@
                 <a:latin typeface="Arial" charset="0"/>
                 <a:ea typeface="ＭＳ Ｐゴシック" charset="0"/>
               </a:rPr>
-              <a:t>Heterogeneous </a:t>
-            </a:r>
-            <a:r>
-              <a:rPr lang="en-US" sz="2000" dirty="0" smtClean="0">
-                <a:latin typeface="Arial" charset="0"/>
-                <a:ea typeface="ＭＳ Ｐゴシック" charset="0"/>
-              </a:rPr>
-              <a:t>software </a:t>
-            </a:r>
-            <a:r>
-              <a:rPr lang="en-US" sz="2000" dirty="0" smtClean="0">
-                <a:latin typeface="Arial" charset="0"/>
-                <a:ea typeface="ＭＳ Ｐゴシック" charset="0"/>
-              </a:rPr>
-              <a:t>and system access layers</a:t>
-            </a:r>
-            <a:endParaRPr lang="en-US" sz="2000" dirty="0" smtClean="0">
-              <a:latin typeface="Arial" charset="0"/>
-              <a:ea typeface="ＭＳ Ｐゴシック" charset="0"/>
-            </a:endParaRPr>
+              <a:t>Heterogeneous software and system access layers</a:t>
+            </a:r>
           </a:p>
           <a:p>
             <a:pPr lvl="1">
@@ -6483,14 +6394,7 @@
                 <a:latin typeface="Arial" charset="0"/>
                 <a:ea typeface="ＭＳ Ｐゴシック" charset="0"/>
               </a:rPr>
-              <a:t>offs </a:t>
-            </a:r>
-            <a:r>
-              <a:rPr lang="en-US" sz="2000" dirty="0" smtClean="0">
-                <a:latin typeface="Arial" charset="0"/>
-                <a:ea typeface="ＭＳ Ｐゴシック" charset="0"/>
-              </a:rPr>
-              <a:t>etc., </a:t>
+              <a:t>offs etc., </a:t>
             </a:r>
           </a:p>
           <a:p>
@@ -6504,14 +6408,7 @@
                 <a:latin typeface="Arial" charset="0"/>
                 <a:ea typeface="ＭＳ Ｐゴシック" charset="0"/>
               </a:rPr>
-              <a:t>Currently difficult to estimate and mostly </a:t>
-            </a:r>
-            <a:r>
-              <a:rPr lang="en-US" sz="2000" dirty="0" smtClean="0">
-                <a:latin typeface="Arial" charset="0"/>
-                <a:ea typeface="ＭＳ Ｐゴシック" charset="0"/>
-              </a:rPr>
-              <a:t>ir</a:t>
+              <a:t>Currently difficult to estimate and mostly ir</a:t>
             </a:r>
             <a:r>
               <a:rPr lang="en-US" sz="2000" dirty="0" smtClean="0"/>
@@ -6529,14 +6426,7 @@
                 <a:latin typeface="Arial" charset="0"/>
                 <a:ea typeface="ＭＳ Ｐゴシック" charset="0"/>
               </a:rPr>
-              <a:t>Implementation </a:t>
-            </a:r>
-            <a:r>
-              <a:rPr lang="en-US" sz="2000" dirty="0" smtClean="0">
-                <a:latin typeface="Arial" charset="0"/>
-                <a:ea typeface="ＭＳ Ｐゴシック" charset="0"/>
-              </a:rPr>
-              <a:t>abstractions that enable effective engineering </a:t>
+              <a:t>Implementation abstractions that enable effective engineering </a:t>
             </a:r>
           </a:p>
           <a:p>
@@ -6719,11 +6609,7 @@
           <a:p>
             <a:r>
               <a:rPr lang="en-US" dirty="0" smtClean="0"/>
-              <a:t>Fundamental </a:t>
-            </a:r>
-            <a:r>
-              <a:rPr lang="en-US" dirty="0" smtClean="0"/>
-              <a:t>conceptual </a:t>
+              <a:t>Fundamental conceptual </a:t>
             </a:r>
             <a:r>
               <a:rPr lang="en-US" dirty="0"/>
@@ -6733,7 +6619,6 @@
               <a:rPr lang="en-US" dirty="0" smtClean="0"/>
               <a:t>ap in providing well-defined capabilities</a:t>
             </a:r>
-            <a:endParaRPr lang="en-US" dirty="0" smtClean="0"/>
           </a:p>
           <a:p>
             <a:pPr lvl="1"/>
@@ -6805,11 +6690,7 @@
             </a:r>
             <a:r>
               <a:rPr lang="en-US" sz="2000" dirty="0" smtClean="0"/>
-              <a:t>Pilot-</a:t>
-            </a:r>
-            <a:r>
-              <a:rPr lang="en-US" sz="2000" dirty="0" smtClean="0"/>
-              <a:t>systems </a:t>
+              <a:t>Pilot-systems </a:t>
             </a:r>
             <a:r>
               <a:rPr lang="en-US" sz="2000" dirty="0" smtClean="0">
@@ -6846,15 +6727,7 @@
             </a:r>
             <a:r>
               <a:rPr lang="en-US" sz="2000" dirty="0" smtClean="0"/>
-              <a:t> at multiple, integrated </a:t>
-            </a:r>
-            <a:r>
-              <a:rPr lang="en-US" sz="2000" dirty="0" smtClean="0"/>
-              <a:t>levels to provide </a:t>
-            </a:r>
-            <a:r>
-              <a:rPr lang="en-US" sz="2000" dirty="0" smtClean="0"/>
-              <a:t>performance </a:t>
+              <a:t> at multiple, integrated levels to provide performance </a:t>
             </a:r>
             <a:r>
               <a:rPr lang="en-US" sz="2000" dirty="0"/>

</xml_diff>